<commit_message>
Updated some code inconsistencies and random errors in PPT
</commit_message>
<xml_diff>
--- a/Job_Submission/hpc_job_submission_Fall2018.pptx
+++ b/Job_Submission/hpc_job_submission_Fall2018.pptx
@@ -242,7 +242,7 @@
           <a:p>
             <a:fld id="{BA6B0541-0E19-3140-A75D-83F0091FD087}" type="datetimeFigureOut">
               <a:rPr lang="en-US" smtClean="0"/>
-              <a:t>10/12/18</a:t>
+              <a:t>10/15/18</a:t>
             </a:fld>
             <a:endParaRPr lang="en-US"/>
           </a:p>
@@ -449,7 +449,7 @@
           <a:p>
             <a:fld id="{82C6759A-F17A-D54D-8D7A-CB146702B30D}" type="datetimeFigureOut">
               <a:rPr lang="en-US" smtClean="0"/>
-              <a:t>10/12/18</a:t>
+              <a:t>10/15/18</a:t>
             </a:fld>
             <a:endParaRPr lang="en-US"/>
           </a:p>
@@ -9315,8 +9315,8 @@
         </p:nvSpPr>
         <p:spPr>
           <a:xfrm>
-            <a:off x="3443660" y="4618176"/>
-            <a:ext cx="3407899" cy="1349589"/>
+            <a:off x="2605548" y="4618176"/>
+            <a:ext cx="5958349" cy="1397807"/>
           </a:xfrm>
           <a:prstGeom prst="rect">
             <a:avLst/>
@@ -9328,112 +9328,63 @@
           </a:bodyPr>
           <a:lstStyle/>
           <a:p>
-            <a:pPr marL="12689" marR="5075">
-              <a:lnSpc>
-                <a:spcPct val="120400"/>
-              </a:lnSpc>
-              <a:spcBef>
-                <a:spcPts val="99"/>
-              </a:spcBef>
-            </a:pPr>
-            <a:r>
-              <a:rPr sz="2400" spc="-6" dirty="0" err="1">
-                <a:solidFill>
-                  <a:srgbClr val="2F2B20"/>
-                </a:solidFill>
-                <a:latin typeface="Courier New"/>
-                <a:cs typeface="Courier New"/>
+            <a:r>
+              <a:rPr lang="en-US" dirty="0">
+                <a:latin typeface="Courier New" panose="02070309020205020404" pitchFamily="49" charset="0"/>
+                <a:cs typeface="Courier New" panose="02070309020205020404" pitchFamily="49" charset="0"/>
+              </a:rPr>
+              <a:t>echo "I am" `</a:t>
+            </a:r>
+            <a:r>
+              <a:rPr lang="en-US" dirty="0" err="1">
+                <a:latin typeface="Courier New" panose="02070309020205020404" pitchFamily="49" charset="0"/>
+                <a:cs typeface="Courier New" panose="02070309020205020404" pitchFamily="49" charset="0"/>
               </a:rPr>
               <a:t>whoami</a:t>
             </a:r>
             <a:r>
-              <a:rPr sz="2400" spc="-6" dirty="0">
-                <a:solidFill>
-                  <a:srgbClr val="2F2B20"/>
-                </a:solidFill>
-                <a:latin typeface="Courier New"/>
-                <a:cs typeface="Courier New"/>
-              </a:rPr>
-              <a:t>  </a:t>
-            </a:r>
-            <a:endParaRPr lang="en-US" sz="2400" spc="-6" dirty="0">
-              <a:solidFill>
-                <a:srgbClr val="2F2B20"/>
-              </a:solidFill>
-              <a:latin typeface="Courier New"/>
-              <a:cs typeface="Courier New"/>
-            </a:endParaRPr>
-          </a:p>
-          <a:p>
-            <a:pPr marL="12689" marR="5075">
-              <a:lnSpc>
-                <a:spcPct val="120400"/>
-              </a:lnSpc>
-              <a:spcBef>
-                <a:spcPts val="99"/>
-              </a:spcBef>
-            </a:pPr>
-            <a:r>
-              <a:rPr sz="2400" spc="-6" dirty="0">
-                <a:solidFill>
-                  <a:srgbClr val="2F2B20"/>
-                </a:solidFill>
-                <a:latin typeface="Courier New"/>
-                <a:cs typeface="Courier New"/>
-              </a:rPr>
-              <a:t>sleep</a:t>
-            </a:r>
-            <a:r>
-              <a:rPr sz="2400" spc="-99" dirty="0">
-                <a:solidFill>
-                  <a:srgbClr val="2F2B20"/>
-                </a:solidFill>
-                <a:latin typeface="Courier New"/>
-                <a:cs typeface="Courier New"/>
-              </a:rPr>
-              <a:t> </a:t>
-            </a:r>
-            <a:r>
-              <a:rPr sz="2400" spc="-6" dirty="0">
-                <a:solidFill>
-                  <a:srgbClr val="2F2B20"/>
-                </a:solidFill>
-                <a:latin typeface="Courier New"/>
-                <a:cs typeface="Courier New"/>
-              </a:rPr>
-              <a:t>30  </a:t>
-            </a:r>
-            <a:endParaRPr lang="en-US" sz="2400" spc="-6" dirty="0">
-              <a:solidFill>
-                <a:srgbClr val="2F2B20"/>
-              </a:solidFill>
-              <a:latin typeface="Courier New"/>
-              <a:cs typeface="Courier New"/>
-            </a:endParaRPr>
-          </a:p>
-          <a:p>
-            <a:pPr marL="12689" marR="5075">
-              <a:lnSpc>
-                <a:spcPct val="120400"/>
-              </a:lnSpc>
-              <a:spcBef>
-                <a:spcPts val="99"/>
-              </a:spcBef>
-            </a:pPr>
-            <a:r>
-              <a:rPr sz="2400" spc="-6" dirty="0">
-                <a:solidFill>
-                  <a:srgbClr val="2F2B20"/>
-                </a:solidFill>
-                <a:latin typeface="Courier New"/>
-                <a:cs typeface="Courier New"/>
-              </a:rPr>
-              <a:t>hostname</a:t>
-            </a:r>
-            <a:endParaRPr sz="2400" dirty="0">
-              <a:latin typeface="Courier New"/>
-              <a:cs typeface="Courier New"/>
-            </a:endParaRPr>
+              <a:rPr lang="en-US" dirty="0">
+                <a:latin typeface="Courier New" panose="02070309020205020404" pitchFamily="49" charset="0"/>
+                <a:cs typeface="Courier New" panose="02070309020205020404" pitchFamily="49" charset="0"/>
+              </a:rPr>
+              <a:t>`</a:t>
+            </a:r>
+          </a:p>
+          <a:p>
+            <a:r>
+              <a:rPr lang="en-US" dirty="0">
+                <a:latin typeface="Courier New" panose="02070309020205020404" pitchFamily="49" charset="0"/>
+                <a:cs typeface="Courier New" panose="02070309020205020404" pitchFamily="49" charset="0"/>
+              </a:rPr>
+              <a:t>echo "Running on host" `hostname`</a:t>
+            </a:r>
+          </a:p>
+          <a:p>
+            <a:r>
+              <a:rPr lang="en-US" dirty="0">
+                <a:latin typeface="Courier New" panose="02070309020205020404" pitchFamily="49" charset="0"/>
+                <a:cs typeface="Courier New" panose="02070309020205020404" pitchFamily="49" charset="0"/>
+              </a:rPr>
+              <a:t>echo "Starting Sleep"</a:t>
+            </a:r>
+          </a:p>
+          <a:p>
+            <a:r>
+              <a:rPr lang="en-US" dirty="0">
+                <a:latin typeface="Courier New" panose="02070309020205020404" pitchFamily="49" charset="0"/>
+                <a:cs typeface="Courier New" panose="02070309020205020404" pitchFamily="49" charset="0"/>
+              </a:rPr>
+              <a:t>sleep 30</a:t>
+            </a:r>
+          </a:p>
+          <a:p>
+            <a:r>
+              <a:rPr lang="en-US" dirty="0">
+                <a:latin typeface="Courier New" panose="02070309020205020404" pitchFamily="49" charset="0"/>
+                <a:cs typeface="Courier New" panose="02070309020205020404" pitchFamily="49" charset="0"/>
+              </a:rPr>
+              <a:t>echo "Ending Sleep. Exiting Job!"</a:t>
+            </a:r>
           </a:p>
         </p:txBody>
       </p:sp>
@@ -9460,7 +9411,7 @@
           <a:p>
             <a:fld id="{55148E86-E845-044F-9CB1-4040DF1371C2}" type="datetime1">
               <a:rPr lang="en-US" smtClean="0"/>
-              <a:t>10/15/18</a:t>
+              <a:t>10/16/18</a:t>
             </a:fld>
             <a:endParaRPr lang="en-US"/>
           </a:p>
@@ -14480,7 +14431,7 @@
                 <a:latin typeface="Courier New" panose="02070309020205020404" pitchFamily="49" charset="0"/>
                 <a:cs typeface="Courier New" panose="02070309020205020404" pitchFamily="49" charset="0"/>
               </a:rPr>
-              <a:t>=2			# Number of requested nodes</a:t>
+              <a:t>=4			# Number of requested nodes</a:t>
             </a:r>
           </a:p>
           <a:p>
@@ -16360,7 +16311,7 @@
             </a:pPr>
             <a:r>
               <a:rPr lang="en-US" dirty="0"/>
-              <a:t>Useful when you have 100s too 100,000s of “tiny” serial jobs (&lt;5 min)</a:t>
+              <a:t>Useful when you have 100s to 100,000s of “tiny” serial jobs (&lt;5 min)</a:t>
             </a:r>
           </a:p>
           <a:p>
@@ -16752,27 +16703,16 @@
               <a:t>Contact information:   </a:t>
             </a:r>
             <a:r>
-              <a:rPr lang="en-US" sz="2700" spc="-20" dirty="0" err="1">
+              <a:rPr lang="en-US" sz="2700" spc="-20" dirty="0">
                 <a:solidFill>
                   <a:schemeClr val="bg1">
                     <a:lumMod val="65000"/>
                   </a:schemeClr>
                 </a:solidFill>
                 <a:cs typeface="Tahoma"/>
-              </a:rPr>
-              <a:t>r</a:t>
-            </a:r>
-            <a:r>
-              <a:rPr lang="en-US" sz="2700" spc="-20" dirty="0" err="1">
-                <a:solidFill>
-                  <a:schemeClr val="bg1">
-                    <a:lumMod val="65000"/>
-                  </a:schemeClr>
-                </a:solidFill>
-                <a:cs typeface="Tahoma"/>
                 <a:hlinkClick r:id="rId4"/>
               </a:rPr>
-              <a:t>c-help@Colorado.edu</a:t>
+              <a:t>rc-help@Colorado.edu</a:t>
             </a:r>
             <a:endParaRPr lang="en-US" sz="2700" spc="-20" dirty="0">
               <a:solidFill>

</xml_diff>

<commit_message>
Updated PPT for typos
</commit_message>
<xml_diff>
--- a/Job_Submission/hpc_job_submission_Fall2018.pptx
+++ b/Job_Submission/hpc_job_submission_Fall2018.pptx
@@ -242,7 +242,7 @@
           <a:p>
             <a:fld id="{BA6B0541-0E19-3140-A75D-83F0091FD087}" type="datetimeFigureOut">
               <a:rPr lang="en-US" smtClean="0"/>
-              <a:t>10/15/18</a:t>
+              <a:t>10/16/18</a:t>
             </a:fld>
             <a:endParaRPr lang="en-US"/>
           </a:p>
@@ -449,7 +449,7 @@
           <a:p>
             <a:fld id="{82C6759A-F17A-D54D-8D7A-CB146702B30D}" type="datetimeFigureOut">
               <a:rPr lang="en-US" smtClean="0"/>
-              <a:t>10/15/18</a:t>
+              <a:t>10/16/18</a:t>
             </a:fld>
             <a:endParaRPr lang="en-US"/>
           </a:p>
@@ -1020,7 +1020,7 @@
           <a:p>
             <a:fld id="{DC96B039-2CCF-4B4B-B301-7697DB5A5277}" type="datetime1">
               <a:rPr lang="en-US" smtClean="0"/>
-              <a:t>10/15/18</a:t>
+              <a:t>10/16/18</a:t>
             </a:fld>
             <a:endParaRPr lang="en-US"/>
           </a:p>
@@ -1219,7 +1219,7 @@
           <a:p>
             <a:fld id="{D8F61728-19A9-6B45-B2A7-E5492F517840}" type="datetime1">
               <a:rPr lang="en-US" smtClean="0"/>
-              <a:t>10/15/18</a:t>
+              <a:t>10/16/18</a:t>
             </a:fld>
             <a:endParaRPr lang="en-US"/>
           </a:p>
@@ -1420,7 +1420,7 @@
           <a:p>
             <a:fld id="{608DF0DA-981B-6344-88FB-9152BD05C7AB}" type="datetime1">
               <a:rPr lang="en-US" smtClean="0"/>
-              <a:t>10/15/18</a:t>
+              <a:t>10/16/18</a:t>
             </a:fld>
             <a:endParaRPr lang="en-US" dirty="0"/>
           </a:p>
@@ -1717,7 +1717,7 @@
           <a:p>
             <a:fld id="{20B068F4-CB99-6240-93C8-CEF97BA3E502}" type="datetime1">
               <a:rPr lang="en-US" smtClean="0"/>
-              <a:t>10/15/18</a:t>
+              <a:t>10/16/18</a:t>
             </a:fld>
             <a:endParaRPr lang="en-US"/>
           </a:p>
@@ -1968,7 +1968,7 @@
           <a:p>
             <a:fld id="{ACC6D769-7553-6B4C-9C89-76DF0A684E98}" type="datetime1">
               <a:rPr lang="en-US" smtClean="0"/>
-              <a:t>10/15/18</a:t>
+              <a:t>10/16/18</a:t>
             </a:fld>
             <a:endParaRPr lang="en-US"/>
           </a:p>
@@ -2354,7 +2354,7 @@
           <a:p>
             <a:fld id="{682316CF-5DE1-0F47-8303-8D12A39A60F3}" type="datetime1">
               <a:rPr lang="en-US" smtClean="0"/>
-              <a:t>10/15/18</a:t>
+              <a:t>10/16/18</a:t>
             </a:fld>
             <a:endParaRPr lang="en-US"/>
           </a:p>
@@ -2491,7 +2491,7 @@
           <a:p>
             <a:fld id="{D59C1FD3-7206-624E-83BF-FD451D8341F4}" type="datetime1">
               <a:rPr lang="en-US" smtClean="0"/>
-              <a:t>10/15/18</a:t>
+              <a:t>10/16/18</a:t>
             </a:fld>
             <a:endParaRPr lang="en-US"/>
           </a:p>
@@ -2605,7 +2605,7 @@
           <a:p>
             <a:fld id="{D05660D4-63A3-7E4D-8F52-BADD2558D752}" type="datetime1">
               <a:rPr lang="en-US" smtClean="0"/>
-              <a:t>10/15/18</a:t>
+              <a:t>10/16/18</a:t>
             </a:fld>
             <a:endParaRPr lang="en-US"/>
           </a:p>
@@ -2901,7 +2901,7 @@
           <a:p>
             <a:fld id="{FCA0986E-711F-3C47-9CAC-B542B420B41F}" type="datetime1">
               <a:rPr lang="en-US" smtClean="0"/>
-              <a:t>10/15/18</a:t>
+              <a:t>10/16/18</a:t>
             </a:fld>
             <a:endParaRPr lang="en-US"/>
           </a:p>
@@ -3177,7 +3177,7 @@
           <a:p>
             <a:fld id="{63E37EC7-F07A-BF46-9088-A285A8762BE3}" type="datetime1">
               <a:rPr lang="en-US" smtClean="0"/>
-              <a:t>10/15/18</a:t>
+              <a:t>10/16/18</a:t>
             </a:fld>
             <a:endParaRPr lang="en-US"/>
           </a:p>
@@ -4077,7 +4077,7 @@
                 <a:cs typeface="Tahoma"/>
                 <a:hlinkClick r:id="rId4"/>
               </a:rPr>
-              <a:t>https://github.com/rctraining/HPC_Short_Course_Fall_2018</a:t>
+              <a:t>https://github.com/ResearchComputing/HPC_Short_Course_Fall_2018</a:t>
             </a:r>
             <a:endParaRPr lang="en-US" i="1" spc="-20" dirty="0">
               <a:solidFill>
@@ -4261,7 +4261,7 @@
           <a:p>
             <a:fld id="{43B8FEF4-1D80-0845-BFC9-5095B6FA6B75}" type="datetime1">
               <a:rPr lang="en-US" smtClean="0"/>
-              <a:t>10/15/18</a:t>
+              <a:t>10/16/18</a:t>
             </a:fld>
             <a:endParaRPr lang="en-US"/>
           </a:p>
@@ -6311,7 +6311,7 @@
           <a:p>
             <a:fld id="{C88D18B9-AC9F-A44E-A5F3-5B376F9C4741}" type="datetime1">
               <a:rPr lang="en-US" smtClean="0"/>
-              <a:t>10/15/18</a:t>
+              <a:t>10/16/18</a:t>
             </a:fld>
             <a:endParaRPr lang="en-US"/>
           </a:p>
@@ -6458,7 +6458,7 @@
           <a:p>
             <a:fld id="{88D93956-398C-7546-90D4-658196C38CC9}" type="datetime1">
               <a:rPr lang="en-US" smtClean="0"/>
-              <a:t>10/15/18</a:t>
+              <a:t>10/16/18</a:t>
             </a:fld>
             <a:endParaRPr lang="en-US"/>
           </a:p>
@@ -7370,7 +7370,7 @@
           <a:p>
             <a:fld id="{594A3C4D-418F-664F-A21C-22B9048F5FE5}" type="datetime1">
               <a:rPr lang="en-US" smtClean="0"/>
-              <a:t>10/15/18</a:t>
+              <a:t>10/16/18</a:t>
             </a:fld>
             <a:endParaRPr lang="en-US"/>
           </a:p>
@@ -7803,7 +7803,7 @@
           <a:p>
             <a:fld id="{608DF0DA-981B-6344-88FB-9152BD05C7AB}" type="datetime1">
               <a:rPr lang="en-US" smtClean="0"/>
-              <a:t>10/15/18</a:t>
+              <a:t>10/16/18</a:t>
             </a:fld>
             <a:endParaRPr lang="en-US" dirty="0"/>
           </a:p>
@@ -8363,7 +8363,7 @@
           <a:p>
             <a:fld id="{88B308DE-644F-A14B-92B7-23A942437830}" type="datetime1">
               <a:rPr lang="en-US" smtClean="0"/>
-              <a:t>10/15/18</a:t>
+              <a:t>10/16/18</a:t>
             </a:fld>
             <a:endParaRPr lang="en-US"/>
           </a:p>
@@ -9771,7 +9771,7 @@
           <a:p>
             <a:fld id="{CE5BC09A-0391-E14D-B203-CF74A79BADF8}" type="datetime1">
               <a:rPr lang="en-US" smtClean="0"/>
-              <a:t>10/15/18</a:t>
+              <a:t>10/16/18</a:t>
             </a:fld>
             <a:endParaRPr lang="en-US"/>
           </a:p>
@@ -10482,7 +10482,7 @@
           <a:p>
             <a:fld id="{40AE7727-E59B-CC4D-B3AB-A802854F2F82}" type="datetime1">
               <a:rPr lang="en-US" smtClean="0"/>
-              <a:t>10/15/18</a:t>
+              <a:t>10/16/18</a:t>
             </a:fld>
             <a:endParaRPr lang="en-US"/>
           </a:p>
@@ -10837,7 +10837,7 @@
           <a:p>
             <a:fld id="{7BD558FE-96B6-3C4E-8B94-38AE01DCFD56}" type="datetime1">
               <a:rPr lang="en-US" smtClean="0"/>
-              <a:t>10/15/18</a:t>
+              <a:t>10/16/18</a:t>
             </a:fld>
             <a:endParaRPr lang="en-US"/>
           </a:p>
@@ -11816,7 +11816,7 @@
           <a:p>
             <a:fld id="{64EBAE62-8937-0C42-BA7D-07894CCE1D2C}" type="datetime1">
               <a:rPr lang="en-US" smtClean="0"/>
-              <a:t>10/15/18</a:t>
+              <a:t>10/16/18</a:t>
             </a:fld>
             <a:endParaRPr lang="en-US"/>
           </a:p>
@@ -12150,7 +12150,7 @@
           <a:p>
             <a:fld id="{86695AE7-D3F4-A548-B5B1-25C1E0613904}" type="datetime1">
               <a:rPr lang="en-US" smtClean="0"/>
-              <a:t>10/15/18</a:t>
+              <a:t>10/16/18</a:t>
             </a:fld>
             <a:endParaRPr lang="en-US"/>
           </a:p>
@@ -12442,7 +12442,7 @@
           <a:p>
             <a:fld id="{F1FBF58F-B444-B74D-B0EF-81096AA3D4BE}" type="datetime1">
               <a:rPr lang="en-US" smtClean="0"/>
-              <a:t>10/15/18</a:t>
+              <a:t>10/16/18</a:t>
             </a:fld>
             <a:endParaRPr lang="en-US"/>
           </a:p>
@@ -13400,7 +13400,7 @@
           <a:p>
             <a:fld id="{3E66B68D-A8F2-FE4B-A56C-C67011E0D4CA}" type="datetime1">
               <a:rPr lang="en-US" smtClean="0"/>
-              <a:t>10/15/18</a:t>
+              <a:t>10/16/18</a:t>
             </a:fld>
             <a:endParaRPr lang="en-US"/>
           </a:p>
@@ -13762,7 +13762,7 @@
           <a:p>
             <a:fld id="{DE34AD56-1022-894F-9C26-4D64D38742EC}" type="datetime1">
               <a:rPr lang="en-US" smtClean="0"/>
-              <a:t>10/15/18</a:t>
+              <a:t>10/16/18</a:t>
             </a:fld>
             <a:endParaRPr lang="en-US"/>
           </a:p>
@@ -14230,7 +14230,7 @@
           <a:p>
             <a:fld id="{2F85994E-CF55-F24B-97AE-9ED89A93173A}" type="datetime1">
               <a:rPr lang="en-US" smtClean="0"/>
-              <a:t>10/15/18</a:t>
+              <a:t>10/16/18</a:t>
             </a:fld>
             <a:endParaRPr lang="en-US"/>
           </a:p>
@@ -14707,7 +14707,7 @@
           <a:p>
             <a:fld id="{608DF0DA-981B-6344-88FB-9152BD05C7AB}" type="datetime1">
               <a:rPr lang="en-US" smtClean="0"/>
-              <a:t>10/15/18</a:t>
+              <a:t>10/16/18</a:t>
             </a:fld>
             <a:endParaRPr lang="en-US" dirty="0"/>
           </a:p>
@@ -15186,7 +15186,7 @@
           <a:p>
             <a:fld id="{039DD2B5-34CC-9D47-8CF8-26729B19D696}" type="datetime1">
               <a:rPr lang="en-US" smtClean="0"/>
-              <a:t>10/15/18</a:t>
+              <a:t>10/16/18</a:t>
             </a:fld>
             <a:endParaRPr lang="en-US"/>
           </a:p>
@@ -15895,7 +15895,7 @@
           <a:p>
             <a:fld id="{6D26296D-539E-BA45-941D-A6C32547544B}" type="datetime1">
               <a:rPr lang="en-US" smtClean="0"/>
-              <a:t>10/15/18</a:t>
+              <a:t>10/16/18</a:t>
             </a:fld>
             <a:endParaRPr lang="en-US"/>
           </a:p>
@@ -16034,7 +16034,7 @@
           <a:p>
             <a:fld id="{044AC50F-0E9E-C744-9CC7-70B1938DDCA8}" type="datetime1">
               <a:rPr lang="en-US" smtClean="0"/>
-              <a:t>10/15/18</a:t>
+              <a:t>10/16/18</a:t>
             </a:fld>
             <a:endParaRPr lang="en-US"/>
           </a:p>
@@ -16434,50 +16434,16 @@
             <a:r>
               <a:rPr lang="en-US" i="1" dirty="0">
                 <a:cs typeface="Arial"/>
-              </a:rPr>
-              <a:t>https://</a:t>
-            </a:r>
-            <a:r>
-              <a:rPr lang="en-US" i="1" dirty="0" err="1">
-                <a:cs typeface="Arial"/>
-              </a:rPr>
-              <a:t>github.com</a:t>
+                <a:hlinkClick r:id="rId2"/>
+              </a:rPr>
+              <a:t>https://github.com/ResearchComputing/Documentation/wiki/The-Load-Balancer-Tool</a:t>
             </a:r>
             <a:r>
               <a:rPr lang="en-US" i="1" dirty="0">
                 <a:cs typeface="Arial"/>
               </a:rPr>
-              <a:t>/</a:t>
-            </a:r>
-            <a:r>
-              <a:rPr lang="en-US" i="1" dirty="0" err="1">
-                <a:cs typeface="Arial"/>
-              </a:rPr>
-              <a:t>ResearchComputing</a:t>
-            </a:r>
-            <a:r>
-              <a:rPr lang="en-US" i="1" dirty="0">
-                <a:cs typeface="Arial"/>
-              </a:rPr>
-              <a:t>/Research-Computing-User-Tutorials/wiki/The-Load-Balancer-Tool</a:t>
-            </a:r>
-          </a:p>
-          <a:p>
-            <a:pPr marL="698300" marR="5075" lvl="1" indent="-228411">
-              <a:lnSpc>
-                <a:spcPct val="100000"/>
-              </a:lnSpc>
-              <a:spcBef>
-                <a:spcPts val="400"/>
-              </a:spcBef>
-              <a:buClr>
-                <a:srgbClr val="A9A57C"/>
-              </a:buClr>
-              <a:tabLst>
-                <a:tab pos="240465" algn="l"/>
-                <a:tab pos="241100" algn="l"/>
-              </a:tabLst>
-            </a:pPr>
+              <a:t> </a:t>
+            </a:r>
             <a:endParaRPr lang="en-US" dirty="0">
               <a:cs typeface="Arial"/>
             </a:endParaRPr>
@@ -16852,14 +16818,17 @@
                 <a:cs typeface="Tahoma"/>
                 <a:hlinkClick r:id="rId7"/>
               </a:rPr>
-              <a:t>https://github.com/ResearchComputing/Research-Computing-User-Tutorials/wiki/The-Load-Balancer-Tool</a:t>
-            </a:r>
-            <a:endParaRPr lang="en-US" sz="2700" spc="-50" dirty="0">
-              <a:solidFill>
-                <a:srgbClr val="999999"/>
-              </a:solidFill>
-              <a:cs typeface="Tahoma"/>
-            </a:endParaRPr>
+              <a:t>https://github.com/ResearchComputing/Documentation/wiki/The-Load-Balancer-Tool</a:t>
+            </a:r>
+            <a:r>
+              <a:rPr lang="en-US" sz="2700" spc="-50" dirty="0">
+                <a:solidFill>
+                  <a:srgbClr val="999999"/>
+                </a:solidFill>
+                <a:cs typeface="Tahoma"/>
+              </a:rPr>
+              <a:t> </a:t>
+            </a:r>
           </a:p>
           <a:p>
             <a:pPr marL="25168" marR="59144">
@@ -16920,7 +16889,7 @@
           <a:p>
             <a:fld id="{608DF0DA-981B-6344-88FB-9152BD05C7AB}" type="datetime1">
               <a:rPr lang="en-US" smtClean="0"/>
-              <a:t>10/15/18</a:t>
+              <a:t>10/16/18</a:t>
             </a:fld>
             <a:endParaRPr lang="en-US" dirty="0"/>
           </a:p>
@@ -17191,7 +17160,7 @@
           <a:p>
             <a:fld id="{561C9957-296D-C949-82EC-A43D8C7DF8AB}" type="datetime1">
               <a:rPr lang="en-US" smtClean="0"/>
-              <a:t>10/15/18</a:t>
+              <a:t>10/16/18</a:t>
             </a:fld>
             <a:endParaRPr lang="en-US"/>
           </a:p>
@@ -17426,7 +17395,7 @@
           <a:p>
             <a:fld id="{36F9382C-BBDE-B94C-A4BD-66B1FE83D759}" type="datetime1">
               <a:rPr lang="en-US" smtClean="0"/>
-              <a:t>10/15/18</a:t>
+              <a:t>10/16/18</a:t>
             </a:fld>
             <a:endParaRPr lang="en-US"/>
           </a:p>
@@ -17974,7 +17943,7 @@
           <a:p>
             <a:fld id="{FD270C43-AF2D-AA40-9C7B-C832E9D45669}" type="datetime1">
               <a:rPr lang="en-US" smtClean="0"/>
-              <a:t>10/15/18</a:t>
+              <a:t>10/16/18</a:t>
             </a:fld>
             <a:endParaRPr lang="en-US"/>
           </a:p>
@@ -18468,7 +18437,7 @@
           <a:p>
             <a:fld id="{ECDBAB96-A6BC-384B-8C71-A0C52DAB8078}" type="datetime1">
               <a:rPr lang="en-US" smtClean="0"/>
-              <a:t>10/15/18</a:t>
+              <a:t>10/16/18</a:t>
             </a:fld>
             <a:endParaRPr lang="en-US"/>
           </a:p>
@@ -19244,7 +19213,7 @@
           <a:p>
             <a:fld id="{BC5A9D9C-513D-3C42-BBEF-A85537C43881}" type="datetime1">
               <a:rPr lang="en-US" smtClean="0"/>
-              <a:t>10/15/18</a:t>
+              <a:t>10/16/18</a:t>
             </a:fld>
             <a:endParaRPr lang="en-US"/>
           </a:p>
@@ -20549,7 +20518,7 @@
           <a:p>
             <a:fld id="{6FB416AB-7BDD-F04F-9A24-8EE0DAD8DDDA}" type="datetime1">
               <a:rPr lang="en-US" smtClean="0"/>
-              <a:t>10/15/18</a:t>
+              <a:t>10/16/18</a:t>
             </a:fld>
             <a:endParaRPr lang="en-US"/>
           </a:p>
@@ -22741,7 +22710,7 @@
           <a:p>
             <a:fld id="{25E65980-49FF-474D-9DF8-E38D2DDADD61}" type="datetime1">
               <a:rPr lang="en-US" smtClean="0"/>
-              <a:t>10/15/18</a:t>
+              <a:t>10/16/18</a:t>
             </a:fld>
             <a:endParaRPr lang="en-US"/>
           </a:p>

</xml_diff>

<commit_message>
Updated scripts for new tutorial name
</commit_message>
<xml_diff>
--- a/Job_Submission/hpc_job_submission_Fall2018.pptx
+++ b/Job_Submission/hpc_job_submission_Fall2018.pptx
@@ -242,7 +242,7 @@
           <a:p>
             <a:fld id="{BA6B0541-0E19-3140-A75D-83F0091FD087}" type="datetimeFigureOut">
               <a:rPr lang="en-US" smtClean="0"/>
-              <a:t>10/16/18</a:t>
+              <a:t>10/17/18</a:t>
             </a:fld>
             <a:endParaRPr lang="en-US"/>
           </a:p>
@@ -449,7 +449,7 @@
           <a:p>
             <a:fld id="{82C6759A-F17A-D54D-8D7A-CB146702B30D}" type="datetimeFigureOut">
               <a:rPr lang="en-US" smtClean="0"/>
-              <a:t>10/16/18</a:t>
+              <a:t>10/17/18</a:t>
             </a:fld>
             <a:endParaRPr lang="en-US"/>
           </a:p>
@@ -1020,7 +1020,7 @@
           <a:p>
             <a:fld id="{DC96B039-2CCF-4B4B-B301-7697DB5A5277}" type="datetime1">
               <a:rPr lang="en-US" smtClean="0"/>
-              <a:t>10/16/18</a:t>
+              <a:t>10/17/18</a:t>
             </a:fld>
             <a:endParaRPr lang="en-US"/>
           </a:p>
@@ -1219,7 +1219,7 @@
           <a:p>
             <a:fld id="{D8F61728-19A9-6B45-B2A7-E5492F517840}" type="datetime1">
               <a:rPr lang="en-US" smtClean="0"/>
-              <a:t>10/16/18</a:t>
+              <a:t>10/17/18</a:t>
             </a:fld>
             <a:endParaRPr lang="en-US"/>
           </a:p>
@@ -1420,7 +1420,7 @@
           <a:p>
             <a:fld id="{608DF0DA-981B-6344-88FB-9152BD05C7AB}" type="datetime1">
               <a:rPr lang="en-US" smtClean="0"/>
-              <a:t>10/16/18</a:t>
+              <a:t>10/17/18</a:t>
             </a:fld>
             <a:endParaRPr lang="en-US" dirty="0"/>
           </a:p>
@@ -1717,7 +1717,7 @@
           <a:p>
             <a:fld id="{20B068F4-CB99-6240-93C8-CEF97BA3E502}" type="datetime1">
               <a:rPr lang="en-US" smtClean="0"/>
-              <a:t>10/16/18</a:t>
+              <a:t>10/17/18</a:t>
             </a:fld>
             <a:endParaRPr lang="en-US"/>
           </a:p>
@@ -1968,7 +1968,7 @@
           <a:p>
             <a:fld id="{ACC6D769-7553-6B4C-9C89-76DF0A684E98}" type="datetime1">
               <a:rPr lang="en-US" smtClean="0"/>
-              <a:t>10/16/18</a:t>
+              <a:t>10/17/18</a:t>
             </a:fld>
             <a:endParaRPr lang="en-US"/>
           </a:p>
@@ -2354,7 +2354,7 @@
           <a:p>
             <a:fld id="{682316CF-5DE1-0F47-8303-8D12A39A60F3}" type="datetime1">
               <a:rPr lang="en-US" smtClean="0"/>
-              <a:t>10/16/18</a:t>
+              <a:t>10/17/18</a:t>
             </a:fld>
             <a:endParaRPr lang="en-US"/>
           </a:p>
@@ -2491,7 +2491,7 @@
           <a:p>
             <a:fld id="{D59C1FD3-7206-624E-83BF-FD451D8341F4}" type="datetime1">
               <a:rPr lang="en-US" smtClean="0"/>
-              <a:t>10/16/18</a:t>
+              <a:t>10/17/18</a:t>
             </a:fld>
             <a:endParaRPr lang="en-US"/>
           </a:p>
@@ -2605,7 +2605,7 @@
           <a:p>
             <a:fld id="{D05660D4-63A3-7E4D-8F52-BADD2558D752}" type="datetime1">
               <a:rPr lang="en-US" smtClean="0"/>
-              <a:t>10/16/18</a:t>
+              <a:t>10/17/18</a:t>
             </a:fld>
             <a:endParaRPr lang="en-US"/>
           </a:p>
@@ -2901,7 +2901,7 @@
           <a:p>
             <a:fld id="{FCA0986E-711F-3C47-9CAC-B542B420B41F}" type="datetime1">
               <a:rPr lang="en-US" smtClean="0"/>
-              <a:t>10/16/18</a:t>
+              <a:t>10/17/18</a:t>
             </a:fld>
             <a:endParaRPr lang="en-US"/>
           </a:p>
@@ -3177,7 +3177,7 @@
           <a:p>
             <a:fld id="{63E37EC7-F07A-BF46-9088-A285A8762BE3}" type="datetime1">
               <a:rPr lang="en-US" smtClean="0"/>
-              <a:t>10/16/18</a:t>
+              <a:t>10/17/18</a:t>
             </a:fld>
             <a:endParaRPr lang="en-US"/>
           </a:p>
@@ -4261,7 +4261,7 @@
           <a:p>
             <a:fld id="{43B8FEF4-1D80-0845-BFC9-5095B6FA6B75}" type="datetime1">
               <a:rPr lang="en-US" smtClean="0"/>
-              <a:t>10/16/18</a:t>
+              <a:t>10/17/18</a:t>
             </a:fld>
             <a:endParaRPr lang="en-US"/>
           </a:p>
@@ -6311,7 +6311,7 @@
           <a:p>
             <a:fld id="{C88D18B9-AC9F-A44E-A5F3-5B376F9C4741}" type="datetime1">
               <a:rPr lang="en-US" smtClean="0"/>
-              <a:t>10/16/18</a:t>
+              <a:t>10/17/18</a:t>
             </a:fld>
             <a:endParaRPr lang="en-US"/>
           </a:p>
@@ -6458,7 +6458,7 @@
           <a:p>
             <a:fld id="{88D93956-398C-7546-90D4-658196C38CC9}" type="datetime1">
               <a:rPr lang="en-US" smtClean="0"/>
-              <a:t>10/16/18</a:t>
+              <a:t>10/17/18</a:t>
             </a:fld>
             <a:endParaRPr lang="en-US"/>
           </a:p>
@@ -7241,7 +7241,7 @@
                 </a:solidFill>
                 <a:cs typeface="Arial"/>
               </a:rPr>
-              <a:t>‘tutorial1’</a:t>
+              <a:t>‘tutorial2’</a:t>
             </a:r>
             <a:r>
               <a:rPr lang="en-US" sz="2398" spc="-20" dirty="0">
@@ -7370,7 +7370,7 @@
           <a:p>
             <a:fld id="{594A3C4D-418F-664F-A21C-22B9048F5FE5}" type="datetime1">
               <a:rPr lang="en-US" smtClean="0"/>
-              <a:t>10/16/18</a:t>
+              <a:t>10/17/18</a:t>
             </a:fld>
             <a:endParaRPr lang="en-US"/>
           </a:p>
@@ -7673,7 +7673,7 @@
                 <a:latin typeface="Courier New" panose="02070309020205020404" pitchFamily="49" charset="0"/>
                 <a:cs typeface="Courier New" panose="02070309020205020404" pitchFamily="49" charset="0"/>
               </a:rPr>
-              <a:t>#SBATCH --reservation=tutorial1	# Reservation (workshop only)</a:t>
+              <a:t>#SBATCH --reservation=tutorial2	# Reservation (workshop only)</a:t>
             </a:r>
           </a:p>
           <a:p>
@@ -7803,7 +7803,7 @@
           <a:p>
             <a:fld id="{608DF0DA-981B-6344-88FB-9152BD05C7AB}" type="datetime1">
               <a:rPr lang="en-US" smtClean="0"/>
-              <a:t>10/16/18</a:t>
+              <a:t>10/17/18</a:t>
             </a:fld>
             <a:endParaRPr lang="en-US" dirty="0"/>
           </a:p>
@@ -8363,7 +8363,7 @@
           <a:p>
             <a:fld id="{88B308DE-644F-A14B-92B7-23A942437830}" type="datetime1">
               <a:rPr lang="en-US" smtClean="0"/>
-              <a:t>10/16/18</a:t>
+              <a:t>10/17/18</a:t>
             </a:fld>
             <a:endParaRPr lang="en-US"/>
           </a:p>
@@ -9411,7 +9411,7 @@
           <a:p>
             <a:fld id="{55148E86-E845-044F-9CB1-4040DF1371C2}" type="datetime1">
               <a:rPr lang="en-US" smtClean="0"/>
-              <a:t>10/16/18</a:t>
+              <a:t>10/17/18</a:t>
             </a:fld>
             <a:endParaRPr lang="en-US"/>
           </a:p>
@@ -9771,7 +9771,7 @@
           <a:p>
             <a:fld id="{CE5BC09A-0391-E14D-B203-CF74A79BADF8}" type="datetime1">
               <a:rPr lang="en-US" smtClean="0"/>
-              <a:t>10/16/18</a:t>
+              <a:t>10/17/18</a:t>
             </a:fld>
             <a:endParaRPr lang="en-US"/>
           </a:p>
@@ -10144,7 +10144,7 @@
                 <a:latin typeface="Courier New"/>
                 <a:cs typeface="Courier New"/>
               </a:rPr>
-              <a:t>#SBATCH --reservation=tutorial1		# Reservation (workshop only)</a:t>
+              <a:t>#SBATCH --reservation=tutorial2		# Reservation (workshop only)</a:t>
             </a:r>
             <a:endParaRPr sz="1400" dirty="0">
               <a:latin typeface="Courier New"/>
@@ -10482,7 +10482,7 @@
           <a:p>
             <a:fld id="{40AE7727-E59B-CC4D-B3AB-A802854F2F82}" type="datetime1">
               <a:rPr lang="en-US" smtClean="0"/>
-              <a:t>10/16/18</a:t>
+              <a:t>10/17/18</a:t>
             </a:fld>
             <a:endParaRPr lang="en-US"/>
           </a:p>
@@ -10837,7 +10837,7 @@
           <a:p>
             <a:fld id="{7BD558FE-96B6-3C4E-8B94-38AE01DCFD56}" type="datetime1">
               <a:rPr lang="en-US" smtClean="0"/>
-              <a:t>10/16/18</a:t>
+              <a:t>10/17/18</a:t>
             </a:fld>
             <a:endParaRPr lang="en-US"/>
           </a:p>
@@ -11476,7 +11476,7 @@
                 <a:latin typeface="Courier New"/>
                 <a:cs typeface="Courier New"/>
               </a:rPr>
-              <a:t>tutorial1		# Reservation name</a:t>
+              <a:t>tutorial2		# Reservation name</a:t>
             </a:r>
           </a:p>
           <a:p>
@@ -11816,7 +11816,7 @@
           <a:p>
             <a:fld id="{64EBAE62-8937-0C42-BA7D-07894CCE1D2C}" type="datetime1">
               <a:rPr lang="en-US" smtClean="0"/>
-              <a:t>10/16/18</a:t>
+              <a:t>10/17/18</a:t>
             </a:fld>
             <a:endParaRPr lang="en-US"/>
           </a:p>
@@ -12150,7 +12150,7 @@
           <a:p>
             <a:fld id="{86695AE7-D3F4-A548-B5B1-25C1E0613904}" type="datetime1">
               <a:rPr lang="en-US" smtClean="0"/>
-              <a:t>10/16/18</a:t>
+              <a:t>10/17/18</a:t>
             </a:fld>
             <a:endParaRPr lang="en-US"/>
           </a:p>
@@ -12442,7 +12442,7 @@
           <a:p>
             <a:fld id="{F1FBF58F-B444-B74D-B0EF-81096AA3D4BE}" type="datetime1">
               <a:rPr lang="en-US" smtClean="0"/>
-              <a:t>10/16/18</a:t>
+              <a:t>10/17/18</a:t>
             </a:fld>
             <a:endParaRPr lang="en-US"/>
           </a:p>
@@ -13101,7 +13101,7 @@
                 <a:latin typeface="Courier New"/>
                 <a:cs typeface="Courier New"/>
               </a:rPr>
-              <a:t>tutorial1		# Reservation name</a:t>
+              <a:t>tutorial2		# Reservation name</a:t>
             </a:r>
             <a:endParaRPr sz="1498" dirty="0">
               <a:latin typeface="Courier New"/>
@@ -13400,7 +13400,7 @@
           <a:p>
             <a:fld id="{3E66B68D-A8F2-FE4B-A56C-C67011E0D4CA}" type="datetime1">
               <a:rPr lang="en-US" smtClean="0"/>
-              <a:t>10/16/18</a:t>
+              <a:t>10/17/18</a:t>
             </a:fld>
             <a:endParaRPr lang="en-US"/>
           </a:p>
@@ -13762,7 +13762,7 @@
           <a:p>
             <a:fld id="{DE34AD56-1022-894F-9C26-4D64D38742EC}" type="datetime1">
               <a:rPr lang="en-US" smtClean="0"/>
-              <a:t>10/16/18</a:t>
+              <a:t>10/17/18</a:t>
             </a:fld>
             <a:endParaRPr lang="en-US"/>
           </a:p>
@@ -14230,7 +14230,7 @@
           <a:p>
             <a:fld id="{2F85994E-CF55-F24B-97AE-9ED89A93173A}" type="datetime1">
               <a:rPr lang="en-US" smtClean="0"/>
-              <a:t>10/16/18</a:t>
+              <a:t>10/17/18</a:t>
             </a:fld>
             <a:endParaRPr lang="en-US"/>
           </a:p>
@@ -14547,7 +14547,7 @@
                 <a:latin typeface="Courier New" panose="02070309020205020404" pitchFamily="49" charset="0"/>
                 <a:cs typeface="Courier New" panose="02070309020205020404" pitchFamily="49" charset="0"/>
               </a:rPr>
-              <a:t>#SBATCH --reservation=tutorial1	# Reservation (workshop only)</a:t>
+              <a:t>#SBATCH --reservation=tutorial2	# Reservation (workshop only)</a:t>
             </a:r>
           </a:p>
           <a:p>
@@ -14707,7 +14707,7 @@
           <a:p>
             <a:fld id="{608DF0DA-981B-6344-88FB-9152BD05C7AB}" type="datetime1">
               <a:rPr lang="en-US" smtClean="0"/>
-              <a:t>10/16/18</a:t>
+              <a:t>10/17/18</a:t>
             </a:fld>
             <a:endParaRPr lang="en-US" dirty="0"/>
           </a:p>
@@ -15186,7 +15186,7 @@
           <a:p>
             <a:fld id="{039DD2B5-34CC-9D47-8CF8-26729B19D696}" type="datetime1">
               <a:rPr lang="en-US" smtClean="0"/>
-              <a:t>10/16/18</a:t>
+              <a:t>10/17/18</a:t>
             </a:fld>
             <a:endParaRPr lang="en-US"/>
           </a:p>
@@ -15895,7 +15895,7 @@
           <a:p>
             <a:fld id="{6D26296D-539E-BA45-941D-A6C32547544B}" type="datetime1">
               <a:rPr lang="en-US" smtClean="0"/>
-              <a:t>10/16/18</a:t>
+              <a:t>10/17/18</a:t>
             </a:fld>
             <a:endParaRPr lang="en-US"/>
           </a:p>
@@ -16034,7 +16034,7 @@
           <a:p>
             <a:fld id="{044AC50F-0E9E-C744-9CC7-70B1938DDCA8}" type="datetime1">
               <a:rPr lang="en-US" smtClean="0"/>
-              <a:t>10/16/18</a:t>
+              <a:t>10/17/18</a:t>
             </a:fld>
             <a:endParaRPr lang="en-US"/>
           </a:p>
@@ -16889,7 +16889,7 @@
           <a:p>
             <a:fld id="{608DF0DA-981B-6344-88FB-9152BD05C7AB}" type="datetime1">
               <a:rPr lang="en-US" smtClean="0"/>
-              <a:t>10/16/18</a:t>
+              <a:t>10/17/18</a:t>
             </a:fld>
             <a:endParaRPr lang="en-US" dirty="0"/>
           </a:p>
@@ -17160,7 +17160,7 @@
           <a:p>
             <a:fld id="{561C9957-296D-C949-82EC-A43D8C7DF8AB}" type="datetime1">
               <a:rPr lang="en-US" smtClean="0"/>
-              <a:t>10/16/18</a:t>
+              <a:t>10/17/18</a:t>
             </a:fld>
             <a:endParaRPr lang="en-US"/>
           </a:p>
@@ -17395,7 +17395,7 @@
           <a:p>
             <a:fld id="{36F9382C-BBDE-B94C-A4BD-66B1FE83D759}" type="datetime1">
               <a:rPr lang="en-US" smtClean="0"/>
-              <a:t>10/16/18</a:t>
+              <a:t>10/17/18</a:t>
             </a:fld>
             <a:endParaRPr lang="en-US"/>
           </a:p>
@@ -17943,7 +17943,7 @@
           <a:p>
             <a:fld id="{FD270C43-AF2D-AA40-9C7B-C832E9D45669}" type="datetime1">
               <a:rPr lang="en-US" smtClean="0"/>
-              <a:t>10/16/18</a:t>
+              <a:t>10/17/18</a:t>
             </a:fld>
             <a:endParaRPr lang="en-US"/>
           </a:p>
@@ -18437,7 +18437,7 @@
           <a:p>
             <a:fld id="{ECDBAB96-A6BC-384B-8C71-A0C52DAB8078}" type="datetime1">
               <a:rPr lang="en-US" smtClean="0"/>
-              <a:t>10/16/18</a:t>
+              <a:t>10/17/18</a:t>
             </a:fld>
             <a:endParaRPr lang="en-US"/>
           </a:p>
@@ -19213,7 +19213,7 @@
           <a:p>
             <a:fld id="{BC5A9D9C-513D-3C42-BBEF-A85537C43881}" type="datetime1">
               <a:rPr lang="en-US" smtClean="0"/>
-              <a:t>10/16/18</a:t>
+              <a:t>10/17/18</a:t>
             </a:fld>
             <a:endParaRPr lang="en-US"/>
           </a:p>
@@ -20518,7 +20518,7 @@
           <a:p>
             <a:fld id="{6FB416AB-7BDD-F04F-9A24-8EE0DAD8DDDA}" type="datetime1">
               <a:rPr lang="en-US" smtClean="0"/>
-              <a:t>10/16/18</a:t>
+              <a:t>10/17/18</a:t>
             </a:fld>
             <a:endParaRPr lang="en-US"/>
           </a:p>
@@ -22710,7 +22710,7 @@
           <a:p>
             <a:fld id="{25E65980-49FF-474D-9DF8-E38D2DDADD61}" type="datetime1">
               <a:rPr lang="en-US" smtClean="0"/>
-              <a:t>10/16/18</a:t>
+              <a:t>10/17/18</a:t>
             </a:fld>
             <a:endParaRPr lang="en-US"/>
           </a:p>

</xml_diff>

<commit_message>
Updated a few typos in scripts
</commit_message>
<xml_diff>
--- a/Job_Submission/hpc_job_submission_Fall2018.pptx
+++ b/Job_Submission/hpc_job_submission_Fall2018.pptx
@@ -3946,7 +3946,9 @@
           </a:xfrm>
         </p:spPr>
         <p:txBody>
-          <a:bodyPr/>
+          <a:bodyPr>
+            <a:normAutofit fontScale="92500" lnSpcReduction="10000"/>
+          </a:bodyPr>
           <a:lstStyle/>
           <a:p>
             <a:pPr marL="0" marR="59144" indent="0" algn="ctr">
@@ -4031,9 +4033,6 @@
               </a:rPr>
               <a:t> </a:t>
             </a:r>
-            <a:endParaRPr lang="en-US" spc="-20" dirty="0">
-              <a:cs typeface="Tahoma"/>
-            </a:endParaRPr>
           </a:p>
           <a:p>
             <a:pPr marL="0" marR="59144" indent="0" algn="ctr">
@@ -4057,7 +4056,20 @@
               <a:rPr lang="en-US" spc="-20" dirty="0">
                 <a:cs typeface="Tahoma"/>
               </a:rPr>
-              <a:t>Slides available for download at</a:t>
+              <a:t>Sign in!  </a:t>
+            </a:r>
+            <a:r>
+              <a:rPr lang="en-US" spc="-20" dirty="0">
+                <a:cs typeface="Tahoma"/>
+                <a:hlinkClick r:id="rId4"/>
+              </a:rPr>
+              <a:t>http://tinyurl.com/curc-names</a:t>
+            </a:r>
+            <a:r>
+              <a:rPr lang="en-US" spc="-20" dirty="0">
+                <a:cs typeface="Tahoma"/>
+              </a:rPr>
+              <a:t> </a:t>
             </a:r>
           </a:p>
           <a:p>
@@ -4067,6 +4079,42 @@
               </a:spcBef>
               <a:buNone/>
             </a:pPr>
+            <a:endParaRPr lang="en-US" spc="-20" dirty="0">
+              <a:cs typeface="Tahoma"/>
+            </a:endParaRPr>
+          </a:p>
+          <a:p>
+            <a:pPr marL="0" marR="59144" indent="0" algn="ctr">
+              <a:spcBef>
+                <a:spcPts val="188"/>
+              </a:spcBef>
+              <a:buNone/>
+            </a:pPr>
+            <a:endParaRPr lang="en-US" spc="-20" dirty="0">
+              <a:cs typeface="Tahoma"/>
+            </a:endParaRPr>
+          </a:p>
+          <a:p>
+            <a:pPr marL="0" marR="59144" indent="0" algn="ctr">
+              <a:spcBef>
+                <a:spcPts val="188"/>
+              </a:spcBef>
+              <a:buNone/>
+            </a:pPr>
+            <a:r>
+              <a:rPr lang="en-US" spc="-20" dirty="0">
+                <a:cs typeface="Tahoma"/>
+              </a:rPr>
+              <a:t>Slides available for download at</a:t>
+            </a:r>
+          </a:p>
+          <a:p>
+            <a:pPr marL="0" marR="59144" indent="0" algn="ctr">
+              <a:spcBef>
+                <a:spcPts val="188"/>
+              </a:spcBef>
+              <a:buNone/>
+            </a:pPr>
             <a:r>
               <a:rPr lang="en-US" i="1" spc="-20" dirty="0">
                 <a:solidFill>
@@ -4075,7 +4123,7 @@
                   </a:schemeClr>
                 </a:solidFill>
                 <a:cs typeface="Tahoma"/>
-                <a:hlinkClick r:id="rId4"/>
+                <a:hlinkClick r:id="rId5"/>
               </a:rPr>
               <a:t>https://github.com/ResearchComputing/HPC_Short_Course_Fall_2018</a:t>
             </a:r>
@@ -4159,25 +4207,6 @@
             <a:r>
               <a:rPr lang="en-US" sz="1585" i="1" spc="-50" dirty="0">
                 <a:cs typeface="Tahoma"/>
-                <a:hlinkClick r:id="rId5">
-                  <a:extLst>
-                    <a:ext uri="{A12FA001-AC4F-418D-AE19-62706E023703}">
-                      <ahyp:hlinkClr xmlns:ahyp="http://schemas.microsoft.com/office/drawing/2018/hyperlinkcolor" val="tx"/>
-                    </a:ext>
-                  </a:extLst>
-                </a:hlinkClick>
-              </a:rPr>
-              <a:t>1</a:t>
-            </a:r>
-            <a:r>
-              <a:rPr lang="en-US" sz="1585" i="1" spc="-50" dirty="0">
-                <a:cs typeface="Tahoma"/>
-              </a:rPr>
-              <a:t>, </a:t>
-            </a:r>
-            <a:r>
-              <a:rPr lang="en-US" sz="1585" i="1" spc="-50" dirty="0">
-                <a:cs typeface="Tahoma"/>
                 <a:hlinkClick r:id="rId6">
                   <a:extLst>
                     <a:ext uri="{A12FA001-AC4F-418D-AE19-62706E023703}">
@@ -4186,7 +4215,7 @@
                   </a:extLst>
                 </a:hlinkClick>
               </a:rPr>
-              <a:t>2</a:t>
+              <a:t>1</a:t>
             </a:r>
             <a:r>
               <a:rPr lang="en-US" sz="1585" i="1" spc="-50" dirty="0">
@@ -4205,7 +4234,7 @@
                   </a:extLst>
                 </a:hlinkClick>
               </a:rPr>
-              <a:t>3</a:t>
+              <a:t>2</a:t>
             </a:r>
             <a:r>
               <a:rPr lang="en-US" sz="1585" i="1" spc="-50" dirty="0">
@@ -4217,6 +4246,25 @@
               <a:rPr lang="en-US" sz="1585" i="1" spc="-50" dirty="0">
                 <a:cs typeface="Tahoma"/>
                 <a:hlinkClick r:id="rId8">
+                  <a:extLst>
+                    <a:ext uri="{A12FA001-AC4F-418D-AE19-62706E023703}">
+                      <ahyp:hlinkClr xmlns:ahyp="http://schemas.microsoft.com/office/drawing/2018/hyperlinkcolor" val="tx"/>
+                    </a:ext>
+                  </a:extLst>
+                </a:hlinkClick>
+              </a:rPr>
+              <a:t>3</a:t>
+            </a:r>
+            <a:r>
+              <a:rPr lang="en-US" sz="1585" i="1" spc="-50" dirty="0">
+                <a:cs typeface="Tahoma"/>
+              </a:rPr>
+              <a:t>, </a:t>
+            </a:r>
+            <a:r>
+              <a:rPr lang="en-US" sz="1585" i="1" spc="-50" dirty="0">
+                <a:cs typeface="Tahoma"/>
+                <a:hlinkClick r:id="rId9">
                   <a:extLst>
                     <a:ext uri="{A12FA001-AC4F-418D-AE19-62706E023703}">
                       <ahyp:hlinkClr xmlns:ahyp="http://schemas.microsoft.com/office/drawing/2018/hyperlinkcolor" val="tx"/>
@@ -11764,7 +11812,7 @@
                 <a:latin typeface="Courier New"/>
                 <a:cs typeface="Courier New"/>
               </a:rPr>
-              <a:t> –r ”clear; </a:t>
+              <a:t> –r ”</a:t>
             </a:r>
             <a:r>
               <a:rPr lang="en-US" sz="1498" spc="-6" dirty="0" err="1">
@@ -15579,17 +15627,14 @@
                 <a:latin typeface="Courier New"/>
                 <a:cs typeface="Courier New"/>
               </a:rPr>
-              <a:t>–-</a:t>
-            </a:r>
-            <a:r>
-              <a:rPr lang="en-US" sz="2400" spc="-6" dirty="0" err="1">
-                <a:solidFill>
-                  <a:srgbClr val="2F2B20"/>
-                </a:solidFill>
-                <a:latin typeface="Courier New"/>
-                <a:cs typeface="Courier New"/>
-              </a:rPr>
-              <a:t>ntasks</a:t>
+              <a:t>–-time=00:10:00</a:t>
+            </a:r>
+            <a:r>
+              <a:rPr lang="en-US" sz="2400" dirty="0">
+                <a:latin typeface="Courier New"/>
+                <a:cs typeface="Courier New"/>
+              </a:rPr>
+              <a:t> </a:t>
             </a:r>
             <a:r>
               <a:rPr lang="en-US" sz="2400" spc="-6" dirty="0">
@@ -15599,24 +15644,7 @@
                 <a:latin typeface="Courier New"/>
                 <a:cs typeface="Courier New"/>
               </a:rPr>
-              <a:t>=1</a:t>
-            </a:r>
-            <a:r>
-              <a:rPr lang="en-US" sz="2400" dirty="0">
-                <a:latin typeface="Courier New"/>
-                <a:cs typeface="Courier New"/>
-              </a:rPr>
-              <a:t> </a:t>
-            </a:r>
-            <a:r>
-              <a:rPr lang="en-US" sz="2400" spc="-6" dirty="0">
-                <a:solidFill>
-                  <a:srgbClr val="2F2B20"/>
-                </a:solidFill>
-                <a:latin typeface="Courier New"/>
-                <a:cs typeface="Courier New"/>
-              </a:rPr>
-              <a:t>--reservation=tutorial1</a:t>
+              <a:t>--reservation=tutorial2</a:t>
             </a:r>
             <a:endParaRPr lang="en-US" sz="2400" dirty="0">
               <a:latin typeface="Courier New"/>
@@ -16623,7 +16651,7 @@
               <a:rPr lang="en-US" sz="2700" spc="-20" dirty="0">
                 <a:cs typeface="Tahoma"/>
               </a:rPr>
-              <a:t>Register!  </a:t>
+              <a:t>Sign in!  </a:t>
             </a:r>
             <a:r>
               <a:rPr lang="en-US" sz="2700" spc="-20" dirty="0">
@@ -18579,7 +18607,7 @@
                 <a:spcPts val="650"/>
               </a:spcBef>
               <a:buClr>
-                <a:srgbClr val="A9A57C"/>
+                <a:schemeClr val="tx1"/>
               </a:buClr>
               <a:buFont typeface="Arial"/>
               <a:buChar char="•"/>
@@ -18673,7 +18701,7 @@
                 <a:spcPts val="535"/>
               </a:spcBef>
               <a:buClr>
-                <a:srgbClr val="A9A57C"/>
+                <a:schemeClr val="tx1"/>
               </a:buClr>
               <a:tabLst>
                 <a:tab pos="269652" algn="l"/>
@@ -18833,7 +18861,7 @@
                 <a:spcPts val="555"/>
               </a:spcBef>
               <a:buClr>
-                <a:srgbClr val="A9A57C"/>
+                <a:schemeClr val="tx1"/>
               </a:buClr>
               <a:tabLst>
                 <a:tab pos="269652" algn="l"/>
@@ -18948,7 +18976,7 @@
                 <a:spcPts val="555"/>
               </a:spcBef>
               <a:buClr>
-                <a:srgbClr val="A9A57C"/>
+                <a:schemeClr val="tx1"/>
               </a:buClr>
               <a:tabLst>
                 <a:tab pos="269652" algn="l"/>
@@ -18970,7 +18998,7 @@
                 <a:spcPts val="555"/>
               </a:spcBef>
               <a:buClr>
-                <a:srgbClr val="A9A57C"/>
+                <a:schemeClr val="tx1"/>
               </a:buClr>
               <a:tabLst>
                 <a:tab pos="269652" algn="l"/>
@@ -18989,7 +19017,7 @@
                 <a:spcPts val="555"/>
               </a:spcBef>
               <a:buClr>
-                <a:srgbClr val="A9A57C"/>
+                <a:schemeClr val="tx1"/>
               </a:buClr>
               <a:tabLst>
                 <a:tab pos="269652" algn="l"/>
@@ -19051,7 +19079,7 @@
                 <a:spcPts val="555"/>
               </a:spcBef>
               <a:buClr>
-                <a:srgbClr val="A9A57C"/>
+                <a:schemeClr val="tx1"/>
               </a:buClr>
               <a:tabLst>
                 <a:tab pos="269652" algn="l"/>
@@ -19075,6 +19103,9 @@
               <a:spcBef>
                 <a:spcPts val="355"/>
               </a:spcBef>
+              <a:buClr>
+                <a:schemeClr val="tx1"/>
+              </a:buClr>
             </a:pPr>
             <a:r>
               <a:rPr lang="en-US" spc="-6" dirty="0">
@@ -19084,7 +19115,7 @@
                 <a:latin typeface="Courier New"/>
                 <a:cs typeface="Courier New"/>
               </a:rPr>
-              <a:t>  </a:t>
+              <a:t> </a:t>
             </a:r>
             <a:r>
               <a:rPr lang="en-US" spc="-6" dirty="0" err="1">

</xml_diff>